<commit_message>
documentation fix for scripting guide
</commit_message>
<xml_diff>
--- a/Developers/Scripting_guide/KLayout_PCell.pptx
+++ b/Developers/Scripting_guide/KLayout_PCell.pptx
@@ -863,10 +863,10 @@
           </a:ln>
           <a:extLst>
             <a:ext uri="{FAA26D3D-D897-4be2-8F04-BA451C77F1D7}">
-              <ma14:placeholderFlag xmlns:ma14="http://schemas.microsoft.com/office/mac/drawingml/2011/main" xmlns="" val="1"/>
+              <ma14:placeholderFlag xmlns="" xmlns:ma14="http://schemas.microsoft.com/office/mac/drawingml/2011/main" val="1"/>
             </a:ext>
             <a:ext uri="{909E8E84-426E-40dd-AFC4-6F175D3DCCD1}">
-              <a14:hiddenFill xmlns="" xmlns:a14="http://schemas.microsoft.com/office/drawing/2010/main">
+              <a14:hiddenFill xmlns:a14="http://schemas.microsoft.com/office/drawing/2010/main" xmlns="">
                 <a:solidFill>
                   <a:srgbClr val="FFFFFF"/>
                 </a:solidFill>
@@ -889,17 +889,17 @@
           <a:noFill/>
           <a:extLst>
             <a:ext uri="{FAA26D3D-D897-4be2-8F04-BA451C77F1D7}">
-              <ma14:placeholderFlag xmlns:ma14="http://schemas.microsoft.com/office/mac/drawingml/2011/main" xmlns="" val="1"/>
+              <ma14:placeholderFlag xmlns="" xmlns:ma14="http://schemas.microsoft.com/office/mac/drawingml/2011/main" val="1"/>
             </a:ext>
             <a:ext uri="{909E8E84-426E-40dd-AFC4-6F175D3DCCD1}">
-              <a14:hiddenFill xmlns="" xmlns:a14="http://schemas.microsoft.com/office/drawing/2010/main">
+              <a14:hiddenFill xmlns:a14="http://schemas.microsoft.com/office/drawing/2010/main" xmlns="">
                 <a:solidFill>
                   <a:srgbClr val="FFFFFF"/>
                 </a:solidFill>
               </a14:hiddenFill>
             </a:ext>
             <a:ext uri="{91240B29-F687-4f45-9708-019B960494DF}">
-              <a14:hiddenLine xmlns="" xmlns:a14="http://schemas.microsoft.com/office/drawing/2010/main" w="9525">
+              <a14:hiddenLine xmlns:a14="http://schemas.microsoft.com/office/drawing/2010/main" xmlns="" w="9525">
                 <a:solidFill>
                   <a:srgbClr val="000000"/>
                 </a:solidFill>
@@ -939,14 +939,14 @@
           <a:noFill/>
           <a:extLst>
             <a:ext uri="{909E8E84-426E-40dd-AFC4-6F175D3DCCD1}">
-              <a14:hiddenFill xmlns="" xmlns:a14="http://schemas.microsoft.com/office/drawing/2010/main">
+              <a14:hiddenFill xmlns:a14="http://schemas.microsoft.com/office/drawing/2010/main" xmlns="">
                 <a:solidFill>
                   <a:srgbClr val="FFFFFF"/>
                 </a:solidFill>
               </a14:hiddenFill>
             </a:ext>
             <a:ext uri="{91240B29-F687-4f45-9708-019B960494DF}">
-              <a14:hiddenLine xmlns="" xmlns:a14="http://schemas.microsoft.com/office/drawing/2010/main" w="9525">
+              <a14:hiddenLine xmlns:a14="http://schemas.microsoft.com/office/drawing/2010/main" xmlns="" w="9525">
                 <a:solidFill>
                   <a:srgbClr val="000000"/>
                 </a:solidFill>
@@ -3421,14 +3421,14 @@
           </a:ln>
           <a:extLst>
             <a:ext uri="{909E8E84-426E-40dd-AFC4-6F175D3DCCD1}">
-              <a14:hiddenFill xmlns:a14="http://schemas.microsoft.com/office/drawing/2010/main" xmlns="">
+              <a14:hiddenFill xmlns="" xmlns:a14="http://schemas.microsoft.com/office/drawing/2010/main">
                 <a:solidFill>
                   <a:srgbClr val="FFFFFF"/>
                 </a:solidFill>
               </a14:hiddenFill>
             </a:ext>
             <a:ext uri="{91240B29-F687-4f45-9708-019B960494DF}">
-              <a14:hiddenLine xmlns:a14="http://schemas.microsoft.com/office/drawing/2010/main" xmlns="" w="9525">
+              <a14:hiddenLine xmlns="" xmlns:a14="http://schemas.microsoft.com/office/drawing/2010/main" w="9525">
                 <a:solidFill>
                   <a:srgbClr val="000000"/>
                 </a:solidFill>
@@ -3682,14 +3682,14 @@
             </a:ln>
             <a:extLst>
               <a:ext uri="{909E8E84-426E-40dd-AFC4-6F175D3DCCD1}">
-                <a14:hiddenFill xmlns:a14="http://schemas.microsoft.com/office/drawing/2010/main" xmlns="">
+                <a14:hiddenFill xmlns="" xmlns:a14="http://schemas.microsoft.com/office/drawing/2010/main">
                   <a:solidFill>
                     <a:srgbClr val="FFFFFF"/>
                   </a:solidFill>
                 </a14:hiddenFill>
               </a:ext>
               <a:ext uri="{91240B29-F687-4f45-9708-019B960494DF}">
-                <a14:hiddenLine xmlns:a14="http://schemas.microsoft.com/office/drawing/2010/main" xmlns="" w="9525">
+                <a14:hiddenLine xmlns="" xmlns:a14="http://schemas.microsoft.com/office/drawing/2010/main" w="9525">
                   <a:solidFill>
                     <a:srgbClr val="000000"/>
                   </a:solidFill>
@@ -3932,14 +3932,14 @@
           </a:ln>
           <a:extLst>
             <a:ext uri="{909E8E84-426E-40dd-AFC4-6F175D3DCCD1}">
-              <a14:hiddenFill xmlns="" xmlns:a14="http://schemas.microsoft.com/office/drawing/2010/main">
+              <a14:hiddenFill xmlns:a14="http://schemas.microsoft.com/office/drawing/2010/main" xmlns="">
                 <a:solidFill>
                   <a:srgbClr val="FFFFFF"/>
                 </a:solidFill>
               </a14:hiddenFill>
             </a:ext>
             <a:ext uri="{91240B29-F687-4f45-9708-019B960494DF}">
-              <a14:hiddenLine xmlns="" xmlns:a14="http://schemas.microsoft.com/office/drawing/2010/main" w="9525">
+              <a14:hiddenLine xmlns:a14="http://schemas.microsoft.com/office/drawing/2010/main" xmlns="" w="9525">
                 <a:solidFill>
                   <a:srgbClr val="000000"/>
                 </a:solidFill>
@@ -4158,14 +4158,14 @@
             </a:ln>
             <a:extLst>
               <a:ext uri="{909E8E84-426E-40dd-AFC4-6F175D3DCCD1}">
-                <a14:hiddenFill xmlns="" xmlns:a14="http://schemas.microsoft.com/office/drawing/2010/main">
+                <a14:hiddenFill xmlns:a14="http://schemas.microsoft.com/office/drawing/2010/main" xmlns="">
                   <a:solidFill>
                     <a:srgbClr val="FFFFFF"/>
                   </a:solidFill>
                 </a14:hiddenFill>
               </a:ext>
               <a:ext uri="{91240B29-F687-4f45-9708-019B960494DF}">
-                <a14:hiddenLine xmlns="" xmlns:a14="http://schemas.microsoft.com/office/drawing/2010/main" w="9525">
+                <a14:hiddenLine xmlns:a14="http://schemas.microsoft.com/office/drawing/2010/main" xmlns="" w="9525">
                   <a:solidFill>
                     <a:srgbClr val="000000"/>
                   </a:solidFill>
@@ -4621,14 +4621,14 @@
           </a:ln>
           <a:extLst>
             <a:ext uri="{909E8E84-426E-40dd-AFC4-6F175D3DCCD1}">
-              <a14:hiddenFill xmlns:a14="http://schemas.microsoft.com/office/drawing/2010/main" xmlns="">
+              <a14:hiddenFill xmlns="" xmlns:a14="http://schemas.microsoft.com/office/drawing/2010/main">
                 <a:solidFill>
                   <a:srgbClr val="FFFFFF"/>
                 </a:solidFill>
               </a14:hiddenFill>
             </a:ext>
             <a:ext uri="{91240B29-F687-4f45-9708-019B960494DF}">
-              <a14:hiddenLine xmlns:a14="http://schemas.microsoft.com/office/drawing/2010/main" xmlns="" w="9525">
+              <a14:hiddenLine xmlns="" xmlns:a14="http://schemas.microsoft.com/office/drawing/2010/main" w="9525">
                 <a:solidFill>
                   <a:srgbClr val="000000"/>
                 </a:solidFill>
@@ -4847,14 +4847,14 @@
             </a:ln>
             <a:extLst>
               <a:ext uri="{909E8E84-426E-40dd-AFC4-6F175D3DCCD1}">
-                <a14:hiddenFill xmlns:a14="http://schemas.microsoft.com/office/drawing/2010/main" xmlns="">
+                <a14:hiddenFill xmlns="" xmlns:a14="http://schemas.microsoft.com/office/drawing/2010/main">
                   <a:solidFill>
                     <a:srgbClr val="FFFFFF"/>
                   </a:solidFill>
                 </a14:hiddenFill>
               </a:ext>
               <a:ext uri="{91240B29-F687-4f45-9708-019B960494DF}">
-                <a14:hiddenLine xmlns:a14="http://schemas.microsoft.com/office/drawing/2010/main" xmlns="" w="9525">
+                <a14:hiddenLine xmlns="" xmlns:a14="http://schemas.microsoft.com/office/drawing/2010/main" w="9525">
                   <a:solidFill>
                     <a:srgbClr val="000000"/>
                   </a:solidFill>
@@ -5097,14 +5097,14 @@
           </a:ln>
           <a:extLst>
             <a:ext uri="{909E8E84-426E-40dd-AFC4-6F175D3DCCD1}">
-              <a14:hiddenFill xmlns="" xmlns:a14="http://schemas.microsoft.com/office/drawing/2010/main">
+              <a14:hiddenFill xmlns:a14="http://schemas.microsoft.com/office/drawing/2010/main" xmlns="">
                 <a:solidFill>
                   <a:srgbClr val="FFFFFF"/>
                 </a:solidFill>
               </a14:hiddenFill>
             </a:ext>
             <a:ext uri="{91240B29-F687-4f45-9708-019B960494DF}">
-              <a14:hiddenLine xmlns="" xmlns:a14="http://schemas.microsoft.com/office/drawing/2010/main" w="9525">
+              <a14:hiddenLine xmlns:a14="http://schemas.microsoft.com/office/drawing/2010/main" xmlns="" w="9525">
                 <a:solidFill>
                   <a:srgbClr val="000000"/>
                 </a:solidFill>
@@ -5358,14 +5358,14 @@
             </a:ln>
             <a:extLst>
               <a:ext uri="{909E8E84-426E-40dd-AFC4-6F175D3DCCD1}">
-                <a14:hiddenFill xmlns="" xmlns:a14="http://schemas.microsoft.com/office/drawing/2010/main">
+                <a14:hiddenFill xmlns:a14="http://schemas.microsoft.com/office/drawing/2010/main" xmlns="">
                   <a:solidFill>
                     <a:srgbClr val="FFFFFF"/>
                   </a:solidFill>
                 </a14:hiddenFill>
               </a:ext>
               <a:ext uri="{91240B29-F687-4f45-9708-019B960494DF}">
-                <a14:hiddenLine xmlns="" xmlns:a14="http://schemas.microsoft.com/office/drawing/2010/main" w="9525">
+                <a14:hiddenLine xmlns:a14="http://schemas.microsoft.com/office/drawing/2010/main" xmlns="" w="9525">
                   <a:solidFill>
                     <a:srgbClr val="000000"/>
                   </a:solidFill>
@@ -5691,14 +5691,14 @@
           </a:ln>
           <a:extLst>
             <a:ext uri="{909E8E84-426E-40dd-AFC4-6F175D3DCCD1}">
-              <a14:hiddenFill xmlns:a14="http://schemas.microsoft.com/office/drawing/2010/main" xmlns="">
+              <a14:hiddenFill xmlns="" xmlns:a14="http://schemas.microsoft.com/office/drawing/2010/main">
                 <a:solidFill>
                   <a:srgbClr val="FFFFFF"/>
                 </a:solidFill>
               </a14:hiddenFill>
             </a:ext>
             <a:ext uri="{91240B29-F687-4f45-9708-019B960494DF}">
-              <a14:hiddenLine xmlns:a14="http://schemas.microsoft.com/office/drawing/2010/main" xmlns="" w="9525">
+              <a14:hiddenLine xmlns="" xmlns:a14="http://schemas.microsoft.com/office/drawing/2010/main" w="9525">
                 <a:solidFill>
                   <a:srgbClr val="000000"/>
                 </a:solidFill>
@@ -5952,14 +5952,14 @@
             </a:ln>
             <a:extLst>
               <a:ext uri="{909E8E84-426E-40dd-AFC4-6F175D3DCCD1}">
-                <a14:hiddenFill xmlns:a14="http://schemas.microsoft.com/office/drawing/2010/main" xmlns="">
+                <a14:hiddenFill xmlns="" xmlns:a14="http://schemas.microsoft.com/office/drawing/2010/main">
                   <a:solidFill>
                     <a:srgbClr val="FFFFFF"/>
                   </a:solidFill>
                 </a14:hiddenFill>
               </a:ext>
               <a:ext uri="{91240B29-F687-4f45-9708-019B960494DF}">
-                <a14:hiddenLine xmlns:a14="http://schemas.microsoft.com/office/drawing/2010/main" xmlns="" w="9525">
+                <a14:hiddenLine xmlns="" xmlns:a14="http://schemas.microsoft.com/office/drawing/2010/main" w="9525">
                   <a:solidFill>
                     <a:srgbClr val="000000"/>
                   </a:solidFill>
@@ -6202,14 +6202,14 @@
           </a:ln>
           <a:extLst>
             <a:ext uri="{909E8E84-426E-40dd-AFC4-6F175D3DCCD1}">
-              <a14:hiddenFill xmlns="" xmlns:a14="http://schemas.microsoft.com/office/drawing/2010/main">
+              <a14:hiddenFill xmlns:a14="http://schemas.microsoft.com/office/drawing/2010/main" xmlns="">
                 <a:solidFill>
                   <a:srgbClr val="FFFFFF"/>
                 </a:solidFill>
               </a14:hiddenFill>
             </a:ext>
             <a:ext uri="{91240B29-F687-4f45-9708-019B960494DF}">
-              <a14:hiddenLine xmlns="" xmlns:a14="http://schemas.microsoft.com/office/drawing/2010/main" w="9525">
+              <a14:hiddenLine xmlns:a14="http://schemas.microsoft.com/office/drawing/2010/main" xmlns="" w="9525">
                 <a:solidFill>
                   <a:srgbClr val="000000"/>
                 </a:solidFill>
@@ -6593,14 +6593,14 @@
             </a:ln>
             <a:extLst>
               <a:ext uri="{909E8E84-426E-40dd-AFC4-6F175D3DCCD1}">
-                <a14:hiddenFill xmlns="" xmlns:a14="http://schemas.microsoft.com/office/drawing/2010/main">
+                <a14:hiddenFill xmlns:a14="http://schemas.microsoft.com/office/drawing/2010/main" xmlns="">
                   <a:solidFill>
                     <a:srgbClr val="FFFFFF"/>
                   </a:solidFill>
                 </a14:hiddenFill>
               </a:ext>
               <a:ext uri="{91240B29-F687-4f45-9708-019B960494DF}">
-                <a14:hiddenLine xmlns="" xmlns:a14="http://schemas.microsoft.com/office/drawing/2010/main" w="9525">
+                <a14:hiddenLine xmlns:a14="http://schemas.microsoft.com/office/drawing/2010/main" xmlns="" w="9525">
                   <a:solidFill>
                     <a:srgbClr val="000000"/>
                   </a:solidFill>
@@ -6738,14 +6738,14 @@
           </a:ln>
           <a:extLst>
             <a:ext uri="{909E8E84-426E-40dd-AFC4-6F175D3DCCD1}">
-              <a14:hiddenFill xmlns:a14="http://schemas.microsoft.com/office/drawing/2010/main" xmlns="">
+              <a14:hiddenFill xmlns="" xmlns:a14="http://schemas.microsoft.com/office/drawing/2010/main">
                 <a:solidFill>
                   <a:srgbClr val="FFFFFF"/>
                 </a:solidFill>
               </a14:hiddenFill>
             </a:ext>
             <a:ext uri="{91240B29-F687-4f45-9708-019B960494DF}">
-              <a14:hiddenLine xmlns:a14="http://schemas.microsoft.com/office/drawing/2010/main" xmlns="" w="9525">
+              <a14:hiddenLine xmlns="" xmlns:a14="http://schemas.microsoft.com/office/drawing/2010/main" w="9525">
                 <a:solidFill>
                   <a:srgbClr val="000000"/>
                 </a:solidFill>
@@ -7129,14 +7129,14 @@
             </a:ln>
             <a:extLst>
               <a:ext uri="{909E8E84-426E-40dd-AFC4-6F175D3DCCD1}">
-                <a14:hiddenFill xmlns:a14="http://schemas.microsoft.com/office/drawing/2010/main" xmlns="">
+                <a14:hiddenFill xmlns="" xmlns:a14="http://schemas.microsoft.com/office/drawing/2010/main">
                   <a:solidFill>
                     <a:srgbClr val="FFFFFF"/>
                   </a:solidFill>
                 </a14:hiddenFill>
               </a:ext>
               <a:ext uri="{91240B29-F687-4f45-9708-019B960494DF}">
-                <a14:hiddenLine xmlns:a14="http://schemas.microsoft.com/office/drawing/2010/main" xmlns="" w="9525">
+                <a14:hiddenLine xmlns="" xmlns:a14="http://schemas.microsoft.com/office/drawing/2010/main" w="9525">
                   <a:solidFill>
                     <a:srgbClr val="000000"/>
                   </a:solidFill>
@@ -7214,14 +7214,14 @@
           </a:ln>
           <a:extLst>
             <a:ext uri="{909E8E84-426E-40dd-AFC4-6F175D3DCCD1}">
-              <a14:hiddenFill xmlns:a14="http://schemas.microsoft.com/office/drawing/2010/main" xmlns="">
+              <a14:hiddenFill xmlns="" xmlns:a14="http://schemas.microsoft.com/office/drawing/2010/main">
                 <a:solidFill>
                   <a:srgbClr val="FFFFFF"/>
                 </a:solidFill>
               </a14:hiddenFill>
             </a:ext>
             <a:ext uri="{91240B29-F687-4f45-9708-019B960494DF}">
-              <a14:hiddenLine xmlns:a14="http://schemas.microsoft.com/office/drawing/2010/main" xmlns="" w="9525">
+              <a14:hiddenLine xmlns="" xmlns:a14="http://schemas.microsoft.com/office/drawing/2010/main" w="9525">
                 <a:solidFill>
                   <a:srgbClr val="000000"/>
                 </a:solidFill>
@@ -7440,14 +7440,14 @@
             </a:ln>
             <a:extLst>
               <a:ext uri="{909E8E84-426E-40dd-AFC4-6F175D3DCCD1}">
-                <a14:hiddenFill xmlns:a14="http://schemas.microsoft.com/office/drawing/2010/main" xmlns="">
+                <a14:hiddenFill xmlns="" xmlns:a14="http://schemas.microsoft.com/office/drawing/2010/main">
                   <a:solidFill>
                     <a:srgbClr val="FFFFFF"/>
                   </a:solidFill>
                 </a14:hiddenFill>
               </a:ext>
               <a:ext uri="{91240B29-F687-4f45-9708-019B960494DF}">
-                <a14:hiddenLine xmlns:a14="http://schemas.microsoft.com/office/drawing/2010/main" xmlns="" w="9525">
+                <a14:hiddenLine xmlns="" xmlns:a14="http://schemas.microsoft.com/office/drawing/2010/main" w="9525">
                   <a:solidFill>
                     <a:srgbClr val="000000"/>
                   </a:solidFill>
@@ -7931,14 +7931,14 @@
           </a:ln>
           <a:extLst>
             <a:ext uri="{909E8E84-426E-40dd-AFC4-6F175D3DCCD1}">
-              <a14:hiddenFill xmlns:a14="http://schemas.microsoft.com/office/drawing/2010/main" xmlns="">
+              <a14:hiddenFill xmlns="" xmlns:a14="http://schemas.microsoft.com/office/drawing/2010/main">
                 <a:solidFill>
                   <a:srgbClr val="FFFFFF"/>
                 </a:solidFill>
               </a14:hiddenFill>
             </a:ext>
             <a:ext uri="{91240B29-F687-4f45-9708-019B960494DF}">
-              <a14:hiddenLine xmlns:a14="http://schemas.microsoft.com/office/drawing/2010/main" xmlns="" w="9525">
+              <a14:hiddenLine xmlns="" xmlns:a14="http://schemas.microsoft.com/office/drawing/2010/main" w="9525">
                 <a:solidFill>
                   <a:srgbClr val="000000"/>
                 </a:solidFill>
@@ -8192,14 +8192,14 @@
             </a:ln>
             <a:extLst>
               <a:ext uri="{909E8E84-426E-40dd-AFC4-6F175D3DCCD1}">
-                <a14:hiddenFill xmlns:a14="http://schemas.microsoft.com/office/drawing/2010/main" xmlns="">
+                <a14:hiddenFill xmlns="" xmlns:a14="http://schemas.microsoft.com/office/drawing/2010/main">
                   <a:solidFill>
                     <a:srgbClr val="FFFFFF"/>
                   </a:solidFill>
                 </a14:hiddenFill>
               </a:ext>
               <a:ext uri="{91240B29-F687-4f45-9708-019B960494DF}">
-                <a14:hiddenLine xmlns:a14="http://schemas.microsoft.com/office/drawing/2010/main" xmlns="" w="9525">
+                <a14:hiddenLine xmlns="" xmlns:a14="http://schemas.microsoft.com/office/drawing/2010/main" w="9525">
                   <a:solidFill>
                     <a:srgbClr val="000000"/>
                   </a:solidFill>
@@ -8555,14 +8555,14 @@
           </a:ln>
           <a:extLst>
             <a:ext uri="{909E8E84-426E-40dd-AFC4-6F175D3DCCD1}">
-              <a14:hiddenFill xmlns:a14="http://schemas.microsoft.com/office/drawing/2010/main" xmlns="">
+              <a14:hiddenFill xmlns="" xmlns:a14="http://schemas.microsoft.com/office/drawing/2010/main">
                 <a:solidFill>
                   <a:srgbClr val="FFFFFF"/>
                 </a:solidFill>
               </a14:hiddenFill>
             </a:ext>
             <a:ext uri="{91240B29-F687-4f45-9708-019B960494DF}">
-              <a14:hiddenLine xmlns:a14="http://schemas.microsoft.com/office/drawing/2010/main" xmlns="" w="9525">
+              <a14:hiddenLine xmlns="" xmlns:a14="http://schemas.microsoft.com/office/drawing/2010/main" w="9525">
                 <a:solidFill>
                   <a:srgbClr val="000000"/>
                 </a:solidFill>
@@ -8946,14 +8946,14 @@
             </a:ln>
             <a:extLst>
               <a:ext uri="{909E8E84-426E-40dd-AFC4-6F175D3DCCD1}">
-                <a14:hiddenFill xmlns:a14="http://schemas.microsoft.com/office/drawing/2010/main" xmlns="">
+                <a14:hiddenFill xmlns="" xmlns:a14="http://schemas.microsoft.com/office/drawing/2010/main">
                   <a:solidFill>
                     <a:srgbClr val="FFFFFF"/>
                   </a:solidFill>
                 </a14:hiddenFill>
               </a:ext>
               <a:ext uri="{91240B29-F687-4f45-9708-019B960494DF}">
-                <a14:hiddenLine xmlns:a14="http://schemas.microsoft.com/office/drawing/2010/main" xmlns="" w="9525">
+                <a14:hiddenLine xmlns="" xmlns:a14="http://schemas.microsoft.com/office/drawing/2010/main" w="9525">
                   <a:solidFill>
                     <a:srgbClr val="000000"/>
                   </a:solidFill>
@@ -13882,17 +13882,17 @@
           </a:ln>
           <a:extLst>
             <a:ext uri="{FAA26D3D-D897-4be2-8F04-BA451C77F1D7}">
-              <ma14:placeholderFlag xmlns:ma14="http://schemas.microsoft.com/office/mac/drawingml/2011/main" xmlns="" val="1"/>
+              <ma14:placeholderFlag xmlns="" xmlns:ma14="http://schemas.microsoft.com/office/mac/drawingml/2011/main" val="1"/>
             </a:ext>
             <a:ext uri="{909E8E84-426E-40dd-AFC4-6F175D3DCCD1}">
-              <a14:hiddenFill xmlns:a14="http://schemas.microsoft.com/office/drawing/2010/main" xmlns="">
+              <a14:hiddenFill xmlns="" xmlns:a14="http://schemas.microsoft.com/office/drawing/2010/main">
                 <a:solidFill>
                   <a:srgbClr val="FFFFFF"/>
                 </a:solidFill>
               </a14:hiddenFill>
             </a:ext>
             <a:ext uri="{91240B29-F687-4f45-9708-019B960494DF}">
-              <a14:hiddenLine xmlns:a14="http://schemas.microsoft.com/office/drawing/2010/main" xmlns="" w="9525">
+              <a14:hiddenLine xmlns="" xmlns:a14="http://schemas.microsoft.com/office/drawing/2010/main" w="9525">
                 <a:solidFill>
                   <a:srgbClr val="000000"/>
                 </a:solidFill>
@@ -13943,17 +13943,17 @@
           </a:ln>
           <a:extLst>
             <a:ext uri="{FAA26D3D-D897-4be2-8F04-BA451C77F1D7}">
-              <ma14:placeholderFlag xmlns:ma14="http://schemas.microsoft.com/office/mac/drawingml/2011/main" xmlns="" val="1"/>
+              <ma14:placeholderFlag xmlns="" xmlns:ma14="http://schemas.microsoft.com/office/mac/drawingml/2011/main" val="1"/>
             </a:ext>
             <a:ext uri="{909E8E84-426E-40dd-AFC4-6F175D3DCCD1}">
-              <a14:hiddenFill xmlns:a14="http://schemas.microsoft.com/office/drawing/2010/main" xmlns="">
+              <a14:hiddenFill xmlns="" xmlns:a14="http://schemas.microsoft.com/office/drawing/2010/main">
                 <a:solidFill>
                   <a:srgbClr val="FFFFFF"/>
                 </a:solidFill>
               </a14:hiddenFill>
             </a:ext>
             <a:ext uri="{91240B29-F687-4f45-9708-019B960494DF}">
-              <a14:hiddenLine xmlns:a14="http://schemas.microsoft.com/office/drawing/2010/main" xmlns="" w="9525">
+              <a14:hiddenLine xmlns="" xmlns:a14="http://schemas.microsoft.com/office/drawing/2010/main" w="9525">
                 <a:solidFill>
                   <a:srgbClr val="000000"/>
                 </a:solidFill>
@@ -14600,17 +14600,17 @@
           </a:ln>
           <a:extLst>
             <a:ext uri="{FAA26D3D-D897-4be2-8F04-BA451C77F1D7}">
-              <ma14:placeholderFlag xmlns="" xmlns:ma14="http://schemas.microsoft.com/office/mac/drawingml/2011/main" val="1"/>
+              <ma14:placeholderFlag xmlns:ma14="http://schemas.microsoft.com/office/mac/drawingml/2011/main" xmlns="" val="1"/>
             </a:ext>
             <a:ext uri="{909E8E84-426E-40dd-AFC4-6F175D3DCCD1}">
-              <a14:hiddenFill xmlns="" xmlns:a14="http://schemas.microsoft.com/office/drawing/2010/main">
+              <a14:hiddenFill xmlns:a14="http://schemas.microsoft.com/office/drawing/2010/main" xmlns="">
                 <a:solidFill>
                   <a:srgbClr val="FFFFFF"/>
                 </a:solidFill>
               </a14:hiddenFill>
             </a:ext>
             <a:ext uri="{91240B29-F687-4f45-9708-019B960494DF}">
-              <a14:hiddenLine xmlns="" xmlns:a14="http://schemas.microsoft.com/office/drawing/2010/main" w="9525">
+              <a14:hiddenLine xmlns:a14="http://schemas.microsoft.com/office/drawing/2010/main" xmlns="" w="9525">
                 <a:solidFill>
                   <a:srgbClr val="000000"/>
                 </a:solidFill>
@@ -14661,17 +14661,17 @@
           </a:ln>
           <a:extLst>
             <a:ext uri="{FAA26D3D-D897-4be2-8F04-BA451C77F1D7}">
-              <ma14:placeholderFlag xmlns="" xmlns:ma14="http://schemas.microsoft.com/office/mac/drawingml/2011/main" val="1"/>
+              <ma14:placeholderFlag xmlns:ma14="http://schemas.microsoft.com/office/mac/drawingml/2011/main" xmlns="" val="1"/>
             </a:ext>
             <a:ext uri="{909E8E84-426E-40dd-AFC4-6F175D3DCCD1}">
-              <a14:hiddenFill xmlns="" xmlns:a14="http://schemas.microsoft.com/office/drawing/2010/main">
+              <a14:hiddenFill xmlns:a14="http://schemas.microsoft.com/office/drawing/2010/main" xmlns="">
                 <a:solidFill>
                   <a:srgbClr val="FFFFFF"/>
                 </a:solidFill>
               </a14:hiddenFill>
             </a:ext>
             <a:ext uri="{91240B29-F687-4f45-9708-019B960494DF}">
-              <a14:hiddenLine xmlns="" xmlns:a14="http://schemas.microsoft.com/office/drawing/2010/main" w="9525">
+              <a14:hiddenLine xmlns:a14="http://schemas.microsoft.com/office/drawing/2010/main" xmlns="" w="9525">
                 <a:solidFill>
                   <a:srgbClr val="000000"/>
                 </a:solidFill>
@@ -15313,17 +15313,17 @@
           </a:ln>
           <a:extLst>
             <a:ext uri="{FAA26D3D-D897-4be2-8F04-BA451C77F1D7}">
-              <ma14:placeholderFlag xmlns="" xmlns:ma14="http://schemas.microsoft.com/office/mac/drawingml/2011/main" val="1"/>
+              <ma14:placeholderFlag xmlns:ma14="http://schemas.microsoft.com/office/mac/drawingml/2011/main" xmlns="" val="1"/>
             </a:ext>
             <a:ext uri="{909E8E84-426E-40dd-AFC4-6F175D3DCCD1}">
-              <a14:hiddenFill xmlns="" xmlns:a14="http://schemas.microsoft.com/office/drawing/2010/main">
+              <a14:hiddenFill xmlns:a14="http://schemas.microsoft.com/office/drawing/2010/main" xmlns="">
                 <a:solidFill>
                   <a:srgbClr val="FFFFFF"/>
                 </a:solidFill>
               </a14:hiddenFill>
             </a:ext>
             <a:ext uri="{91240B29-F687-4f45-9708-019B960494DF}">
-              <a14:hiddenLine xmlns="" xmlns:a14="http://schemas.microsoft.com/office/drawing/2010/main" w="9525">
+              <a14:hiddenLine xmlns:a14="http://schemas.microsoft.com/office/drawing/2010/main" xmlns="" w="9525">
                 <a:solidFill>
                   <a:srgbClr val="000000"/>
                 </a:solidFill>
@@ -15374,17 +15374,17 @@
           </a:ln>
           <a:extLst>
             <a:ext uri="{FAA26D3D-D897-4be2-8F04-BA451C77F1D7}">
-              <ma14:placeholderFlag xmlns="" xmlns:ma14="http://schemas.microsoft.com/office/mac/drawingml/2011/main" val="1"/>
+              <ma14:placeholderFlag xmlns:ma14="http://schemas.microsoft.com/office/mac/drawingml/2011/main" xmlns="" val="1"/>
             </a:ext>
             <a:ext uri="{909E8E84-426E-40dd-AFC4-6F175D3DCCD1}">
-              <a14:hiddenFill xmlns="" xmlns:a14="http://schemas.microsoft.com/office/drawing/2010/main">
+              <a14:hiddenFill xmlns:a14="http://schemas.microsoft.com/office/drawing/2010/main" xmlns="">
                 <a:solidFill>
                   <a:srgbClr val="FFFFFF"/>
                 </a:solidFill>
               </a14:hiddenFill>
             </a:ext>
             <a:ext uri="{91240B29-F687-4f45-9708-019B960494DF}">
-              <a14:hiddenLine xmlns="" xmlns:a14="http://schemas.microsoft.com/office/drawing/2010/main" w="9525">
+              <a14:hiddenLine xmlns:a14="http://schemas.microsoft.com/office/drawing/2010/main" xmlns="" w="9525">
                 <a:solidFill>
                   <a:srgbClr val="000000"/>
                 </a:solidFill>
@@ -16047,14 +16047,14 @@
           </a:ln>
           <a:extLst>
             <a:ext uri="{909E8E84-426E-40dd-AFC4-6F175D3DCCD1}">
-              <a14:hiddenFill xmlns="" xmlns:a14="http://schemas.microsoft.com/office/drawing/2010/main">
+              <a14:hiddenFill xmlns:a14="http://schemas.microsoft.com/office/drawing/2010/main" xmlns="">
                 <a:solidFill>
                   <a:srgbClr val="FFFFFF"/>
                 </a:solidFill>
               </a14:hiddenFill>
             </a:ext>
             <a:ext uri="{91240B29-F687-4f45-9708-019B960494DF}">
-              <a14:hiddenLine xmlns="" xmlns:a14="http://schemas.microsoft.com/office/drawing/2010/main" w="9525">
+              <a14:hiddenLine xmlns:a14="http://schemas.microsoft.com/office/drawing/2010/main" xmlns="" w="9525">
                 <a:solidFill>
                   <a:srgbClr val="000000"/>
                 </a:solidFill>
@@ -16099,14 +16099,14 @@
                 <a:ea typeface="ＭＳ Ｐゴシック" charset="-128"/>
                 <a:cs typeface="Times New Roman" panose="02020603050405020304" pitchFamily="18" charset="0"/>
               </a:rPr>
-              <a:t>: Parameterized Cells </a:t>
-            </a:r>
-            <a:r>
-              <a:rPr kumimoji="0" lang="en-US" altLang="zh-CN" sz="3200" b="1" dirty="0" err="1">
+              <a:t>: Parameterized </a:t>
+            </a:r>
+            <a:r>
+              <a:rPr kumimoji="0" lang="en-US" altLang="zh-CN" sz="3200" b="1">
                 <a:ea typeface="ＭＳ Ｐゴシック" charset="-128"/>
                 <a:cs typeface="Times New Roman" panose="02020603050405020304" pitchFamily="18" charset="0"/>
               </a:rPr>
-              <a:t>Scriptnig</a:t>
+              <a:t>Cells Scripting</a:t>
             </a:r>
             <a:br>
               <a:rPr kumimoji="0" lang="en-US" altLang="zh-CN" sz="3200" b="1" dirty="0">
@@ -16190,14 +16190,14 @@
           </a:ln>
           <a:extLst>
             <a:ext uri="{909E8E84-426E-40dd-AFC4-6F175D3DCCD1}">
-              <a14:hiddenFill xmlns="" xmlns:a14="http://schemas.microsoft.com/office/drawing/2010/main">
+              <a14:hiddenFill xmlns:a14="http://schemas.microsoft.com/office/drawing/2010/main" xmlns="">
                 <a:solidFill>
                   <a:srgbClr val="FFFFFF"/>
                 </a:solidFill>
               </a14:hiddenFill>
             </a:ext>
             <a:ext uri="{91240B29-F687-4f45-9708-019B960494DF}">
-              <a14:hiddenLine xmlns="" xmlns:a14="http://schemas.microsoft.com/office/drawing/2010/main" w="9525">
+              <a14:hiddenLine xmlns:a14="http://schemas.microsoft.com/office/drawing/2010/main" xmlns="" w="9525">
                 <a:solidFill>
                   <a:srgbClr val="000000"/>
                 </a:solidFill>

</xml_diff>

<commit_message>
added example scripted layout: bare
</commit_message>
<xml_diff>
--- a/Developers/Scripting_guide/KLayout_PCell.pptx
+++ b/Developers/Scripting_guide/KLayout_PCell.pptx
@@ -863,10 +863,10 @@
           </a:ln>
           <a:extLst>
             <a:ext uri="{FAA26D3D-D897-4be2-8F04-BA451C77F1D7}">
-              <ma14:placeholderFlag xmlns:ma14="http://schemas.microsoft.com/office/mac/drawingml/2011/main" xmlns="" val="1"/>
+              <ma14:placeholderFlag xmlns="" xmlns:ma14="http://schemas.microsoft.com/office/mac/drawingml/2011/main" val="1"/>
             </a:ext>
             <a:ext uri="{909E8E84-426E-40dd-AFC4-6F175D3DCCD1}">
-              <a14:hiddenFill xmlns="" xmlns:a14="http://schemas.microsoft.com/office/drawing/2010/main">
+              <a14:hiddenFill xmlns:a14="http://schemas.microsoft.com/office/drawing/2010/main" xmlns="">
                 <a:solidFill>
                   <a:srgbClr val="FFFFFF"/>
                 </a:solidFill>
@@ -889,17 +889,17 @@
           <a:noFill/>
           <a:extLst>
             <a:ext uri="{FAA26D3D-D897-4be2-8F04-BA451C77F1D7}">
-              <ma14:placeholderFlag xmlns:ma14="http://schemas.microsoft.com/office/mac/drawingml/2011/main" xmlns="" val="1"/>
+              <ma14:placeholderFlag xmlns="" xmlns:ma14="http://schemas.microsoft.com/office/mac/drawingml/2011/main" val="1"/>
             </a:ext>
             <a:ext uri="{909E8E84-426E-40dd-AFC4-6F175D3DCCD1}">
-              <a14:hiddenFill xmlns="" xmlns:a14="http://schemas.microsoft.com/office/drawing/2010/main">
+              <a14:hiddenFill xmlns:a14="http://schemas.microsoft.com/office/drawing/2010/main" xmlns="">
                 <a:solidFill>
                   <a:srgbClr val="FFFFFF"/>
                 </a:solidFill>
               </a14:hiddenFill>
             </a:ext>
             <a:ext uri="{91240B29-F687-4f45-9708-019B960494DF}">
-              <a14:hiddenLine xmlns="" xmlns:a14="http://schemas.microsoft.com/office/drawing/2010/main" w="9525">
+              <a14:hiddenLine xmlns:a14="http://schemas.microsoft.com/office/drawing/2010/main" xmlns="" w="9525">
                 <a:solidFill>
                   <a:srgbClr val="000000"/>
                 </a:solidFill>
@@ -939,14 +939,14 @@
           <a:noFill/>
           <a:extLst>
             <a:ext uri="{909E8E84-426E-40dd-AFC4-6F175D3DCCD1}">
-              <a14:hiddenFill xmlns="" xmlns:a14="http://schemas.microsoft.com/office/drawing/2010/main">
+              <a14:hiddenFill xmlns:a14="http://schemas.microsoft.com/office/drawing/2010/main" xmlns="">
                 <a:solidFill>
                   <a:srgbClr val="FFFFFF"/>
                 </a:solidFill>
               </a14:hiddenFill>
             </a:ext>
             <a:ext uri="{91240B29-F687-4f45-9708-019B960494DF}">
-              <a14:hiddenLine xmlns="" xmlns:a14="http://schemas.microsoft.com/office/drawing/2010/main" w="9525">
+              <a14:hiddenLine xmlns:a14="http://schemas.microsoft.com/office/drawing/2010/main" xmlns="" w="9525">
                 <a:solidFill>
                   <a:srgbClr val="000000"/>
                 </a:solidFill>
@@ -3421,14 +3421,14 @@
           </a:ln>
           <a:extLst>
             <a:ext uri="{909E8E84-426E-40dd-AFC4-6F175D3DCCD1}">
-              <a14:hiddenFill xmlns:a14="http://schemas.microsoft.com/office/drawing/2010/main" xmlns="">
+              <a14:hiddenFill xmlns="" xmlns:a14="http://schemas.microsoft.com/office/drawing/2010/main">
                 <a:solidFill>
                   <a:srgbClr val="FFFFFF"/>
                 </a:solidFill>
               </a14:hiddenFill>
             </a:ext>
             <a:ext uri="{91240B29-F687-4f45-9708-019B960494DF}">
-              <a14:hiddenLine xmlns:a14="http://schemas.microsoft.com/office/drawing/2010/main" xmlns="" w="9525">
+              <a14:hiddenLine xmlns="" xmlns:a14="http://schemas.microsoft.com/office/drawing/2010/main" w="9525">
                 <a:solidFill>
                   <a:srgbClr val="000000"/>
                 </a:solidFill>
@@ -3682,14 +3682,14 @@
             </a:ln>
             <a:extLst>
               <a:ext uri="{909E8E84-426E-40dd-AFC4-6F175D3DCCD1}">
-                <a14:hiddenFill xmlns:a14="http://schemas.microsoft.com/office/drawing/2010/main" xmlns="">
+                <a14:hiddenFill xmlns="" xmlns:a14="http://schemas.microsoft.com/office/drawing/2010/main">
                   <a:solidFill>
                     <a:srgbClr val="FFFFFF"/>
                   </a:solidFill>
                 </a14:hiddenFill>
               </a:ext>
               <a:ext uri="{91240B29-F687-4f45-9708-019B960494DF}">
-                <a14:hiddenLine xmlns:a14="http://schemas.microsoft.com/office/drawing/2010/main" xmlns="" w="9525">
+                <a14:hiddenLine xmlns="" xmlns:a14="http://schemas.microsoft.com/office/drawing/2010/main" w="9525">
                   <a:solidFill>
                     <a:srgbClr val="000000"/>
                   </a:solidFill>
@@ -3932,14 +3932,14 @@
           </a:ln>
           <a:extLst>
             <a:ext uri="{909E8E84-426E-40dd-AFC4-6F175D3DCCD1}">
-              <a14:hiddenFill xmlns="" xmlns:a14="http://schemas.microsoft.com/office/drawing/2010/main">
+              <a14:hiddenFill xmlns:a14="http://schemas.microsoft.com/office/drawing/2010/main" xmlns="">
                 <a:solidFill>
                   <a:srgbClr val="FFFFFF"/>
                 </a:solidFill>
               </a14:hiddenFill>
             </a:ext>
             <a:ext uri="{91240B29-F687-4f45-9708-019B960494DF}">
-              <a14:hiddenLine xmlns="" xmlns:a14="http://schemas.microsoft.com/office/drawing/2010/main" w="9525">
+              <a14:hiddenLine xmlns:a14="http://schemas.microsoft.com/office/drawing/2010/main" xmlns="" w="9525">
                 <a:solidFill>
                   <a:srgbClr val="000000"/>
                 </a:solidFill>
@@ -4158,14 +4158,14 @@
             </a:ln>
             <a:extLst>
               <a:ext uri="{909E8E84-426E-40dd-AFC4-6F175D3DCCD1}">
-                <a14:hiddenFill xmlns="" xmlns:a14="http://schemas.microsoft.com/office/drawing/2010/main">
+                <a14:hiddenFill xmlns:a14="http://schemas.microsoft.com/office/drawing/2010/main" xmlns="">
                   <a:solidFill>
                     <a:srgbClr val="FFFFFF"/>
                   </a:solidFill>
                 </a14:hiddenFill>
               </a:ext>
               <a:ext uri="{91240B29-F687-4f45-9708-019B960494DF}">
-                <a14:hiddenLine xmlns="" xmlns:a14="http://schemas.microsoft.com/office/drawing/2010/main" w="9525">
+                <a14:hiddenLine xmlns:a14="http://schemas.microsoft.com/office/drawing/2010/main" xmlns="" w="9525">
                   <a:solidFill>
                     <a:srgbClr val="000000"/>
                   </a:solidFill>
@@ -4621,14 +4621,14 @@
           </a:ln>
           <a:extLst>
             <a:ext uri="{909E8E84-426E-40dd-AFC4-6F175D3DCCD1}">
-              <a14:hiddenFill xmlns:a14="http://schemas.microsoft.com/office/drawing/2010/main" xmlns="">
+              <a14:hiddenFill xmlns="" xmlns:a14="http://schemas.microsoft.com/office/drawing/2010/main">
                 <a:solidFill>
                   <a:srgbClr val="FFFFFF"/>
                 </a:solidFill>
               </a14:hiddenFill>
             </a:ext>
             <a:ext uri="{91240B29-F687-4f45-9708-019B960494DF}">
-              <a14:hiddenLine xmlns:a14="http://schemas.microsoft.com/office/drawing/2010/main" xmlns="" w="9525">
+              <a14:hiddenLine xmlns="" xmlns:a14="http://schemas.microsoft.com/office/drawing/2010/main" w="9525">
                 <a:solidFill>
                   <a:srgbClr val="000000"/>
                 </a:solidFill>
@@ -4847,14 +4847,14 @@
             </a:ln>
             <a:extLst>
               <a:ext uri="{909E8E84-426E-40dd-AFC4-6F175D3DCCD1}">
-                <a14:hiddenFill xmlns:a14="http://schemas.microsoft.com/office/drawing/2010/main" xmlns="">
+                <a14:hiddenFill xmlns="" xmlns:a14="http://schemas.microsoft.com/office/drawing/2010/main">
                   <a:solidFill>
                     <a:srgbClr val="FFFFFF"/>
                   </a:solidFill>
                 </a14:hiddenFill>
               </a:ext>
               <a:ext uri="{91240B29-F687-4f45-9708-019B960494DF}">
-                <a14:hiddenLine xmlns:a14="http://schemas.microsoft.com/office/drawing/2010/main" xmlns="" w="9525">
+                <a14:hiddenLine xmlns="" xmlns:a14="http://schemas.microsoft.com/office/drawing/2010/main" w="9525">
                   <a:solidFill>
                     <a:srgbClr val="000000"/>
                   </a:solidFill>
@@ -5097,14 +5097,14 @@
           </a:ln>
           <a:extLst>
             <a:ext uri="{909E8E84-426E-40dd-AFC4-6F175D3DCCD1}">
-              <a14:hiddenFill xmlns="" xmlns:a14="http://schemas.microsoft.com/office/drawing/2010/main">
+              <a14:hiddenFill xmlns:a14="http://schemas.microsoft.com/office/drawing/2010/main" xmlns="">
                 <a:solidFill>
                   <a:srgbClr val="FFFFFF"/>
                 </a:solidFill>
               </a14:hiddenFill>
             </a:ext>
             <a:ext uri="{91240B29-F687-4f45-9708-019B960494DF}">
-              <a14:hiddenLine xmlns="" xmlns:a14="http://schemas.microsoft.com/office/drawing/2010/main" w="9525">
+              <a14:hiddenLine xmlns:a14="http://schemas.microsoft.com/office/drawing/2010/main" xmlns="" w="9525">
                 <a:solidFill>
                   <a:srgbClr val="000000"/>
                 </a:solidFill>
@@ -5358,14 +5358,14 @@
             </a:ln>
             <a:extLst>
               <a:ext uri="{909E8E84-426E-40dd-AFC4-6F175D3DCCD1}">
-                <a14:hiddenFill xmlns="" xmlns:a14="http://schemas.microsoft.com/office/drawing/2010/main">
+                <a14:hiddenFill xmlns:a14="http://schemas.microsoft.com/office/drawing/2010/main" xmlns="">
                   <a:solidFill>
                     <a:srgbClr val="FFFFFF"/>
                   </a:solidFill>
                 </a14:hiddenFill>
               </a:ext>
               <a:ext uri="{91240B29-F687-4f45-9708-019B960494DF}">
-                <a14:hiddenLine xmlns="" xmlns:a14="http://schemas.microsoft.com/office/drawing/2010/main" w="9525">
+                <a14:hiddenLine xmlns:a14="http://schemas.microsoft.com/office/drawing/2010/main" xmlns="" w="9525">
                   <a:solidFill>
                     <a:srgbClr val="000000"/>
                   </a:solidFill>
@@ -5691,14 +5691,14 @@
           </a:ln>
           <a:extLst>
             <a:ext uri="{909E8E84-426E-40dd-AFC4-6F175D3DCCD1}">
-              <a14:hiddenFill xmlns:a14="http://schemas.microsoft.com/office/drawing/2010/main" xmlns="">
+              <a14:hiddenFill xmlns="" xmlns:a14="http://schemas.microsoft.com/office/drawing/2010/main">
                 <a:solidFill>
                   <a:srgbClr val="FFFFFF"/>
                 </a:solidFill>
               </a14:hiddenFill>
             </a:ext>
             <a:ext uri="{91240B29-F687-4f45-9708-019B960494DF}">
-              <a14:hiddenLine xmlns:a14="http://schemas.microsoft.com/office/drawing/2010/main" xmlns="" w="9525">
+              <a14:hiddenLine xmlns="" xmlns:a14="http://schemas.microsoft.com/office/drawing/2010/main" w="9525">
                 <a:solidFill>
                   <a:srgbClr val="000000"/>
                 </a:solidFill>
@@ -5952,14 +5952,14 @@
             </a:ln>
             <a:extLst>
               <a:ext uri="{909E8E84-426E-40dd-AFC4-6F175D3DCCD1}">
-                <a14:hiddenFill xmlns:a14="http://schemas.microsoft.com/office/drawing/2010/main" xmlns="">
+                <a14:hiddenFill xmlns="" xmlns:a14="http://schemas.microsoft.com/office/drawing/2010/main">
                   <a:solidFill>
                     <a:srgbClr val="FFFFFF"/>
                   </a:solidFill>
                 </a14:hiddenFill>
               </a:ext>
               <a:ext uri="{91240B29-F687-4f45-9708-019B960494DF}">
-                <a14:hiddenLine xmlns:a14="http://schemas.microsoft.com/office/drawing/2010/main" xmlns="" w="9525">
+                <a14:hiddenLine xmlns="" xmlns:a14="http://schemas.microsoft.com/office/drawing/2010/main" w="9525">
                   <a:solidFill>
                     <a:srgbClr val="000000"/>
                   </a:solidFill>
@@ -6202,14 +6202,14 @@
           </a:ln>
           <a:extLst>
             <a:ext uri="{909E8E84-426E-40dd-AFC4-6F175D3DCCD1}">
-              <a14:hiddenFill xmlns="" xmlns:a14="http://schemas.microsoft.com/office/drawing/2010/main">
+              <a14:hiddenFill xmlns:a14="http://schemas.microsoft.com/office/drawing/2010/main" xmlns="">
                 <a:solidFill>
                   <a:srgbClr val="FFFFFF"/>
                 </a:solidFill>
               </a14:hiddenFill>
             </a:ext>
             <a:ext uri="{91240B29-F687-4f45-9708-019B960494DF}">
-              <a14:hiddenLine xmlns="" xmlns:a14="http://schemas.microsoft.com/office/drawing/2010/main" w="9525">
+              <a14:hiddenLine xmlns:a14="http://schemas.microsoft.com/office/drawing/2010/main" xmlns="" w="9525">
                 <a:solidFill>
                   <a:srgbClr val="000000"/>
                 </a:solidFill>
@@ -6593,14 +6593,14 @@
             </a:ln>
             <a:extLst>
               <a:ext uri="{909E8E84-426E-40dd-AFC4-6F175D3DCCD1}">
-                <a14:hiddenFill xmlns="" xmlns:a14="http://schemas.microsoft.com/office/drawing/2010/main">
+                <a14:hiddenFill xmlns:a14="http://schemas.microsoft.com/office/drawing/2010/main" xmlns="">
                   <a:solidFill>
                     <a:srgbClr val="FFFFFF"/>
                   </a:solidFill>
                 </a14:hiddenFill>
               </a:ext>
               <a:ext uri="{91240B29-F687-4f45-9708-019B960494DF}">
-                <a14:hiddenLine xmlns="" xmlns:a14="http://schemas.microsoft.com/office/drawing/2010/main" w="9525">
+                <a14:hiddenLine xmlns:a14="http://schemas.microsoft.com/office/drawing/2010/main" xmlns="" w="9525">
                   <a:solidFill>
                     <a:srgbClr val="000000"/>
                   </a:solidFill>
@@ -6738,14 +6738,14 @@
           </a:ln>
           <a:extLst>
             <a:ext uri="{909E8E84-426E-40dd-AFC4-6F175D3DCCD1}">
-              <a14:hiddenFill xmlns:a14="http://schemas.microsoft.com/office/drawing/2010/main" xmlns="">
+              <a14:hiddenFill xmlns="" xmlns:a14="http://schemas.microsoft.com/office/drawing/2010/main">
                 <a:solidFill>
                   <a:srgbClr val="FFFFFF"/>
                 </a:solidFill>
               </a14:hiddenFill>
             </a:ext>
             <a:ext uri="{91240B29-F687-4f45-9708-019B960494DF}">
-              <a14:hiddenLine xmlns:a14="http://schemas.microsoft.com/office/drawing/2010/main" xmlns="" w="9525">
+              <a14:hiddenLine xmlns="" xmlns:a14="http://schemas.microsoft.com/office/drawing/2010/main" w="9525">
                 <a:solidFill>
                   <a:srgbClr val="000000"/>
                 </a:solidFill>
@@ -7129,14 +7129,14 @@
             </a:ln>
             <a:extLst>
               <a:ext uri="{909E8E84-426E-40dd-AFC4-6F175D3DCCD1}">
-                <a14:hiddenFill xmlns:a14="http://schemas.microsoft.com/office/drawing/2010/main" xmlns="">
+                <a14:hiddenFill xmlns="" xmlns:a14="http://schemas.microsoft.com/office/drawing/2010/main">
                   <a:solidFill>
                     <a:srgbClr val="FFFFFF"/>
                   </a:solidFill>
                 </a14:hiddenFill>
               </a:ext>
               <a:ext uri="{91240B29-F687-4f45-9708-019B960494DF}">
-                <a14:hiddenLine xmlns:a14="http://schemas.microsoft.com/office/drawing/2010/main" xmlns="" w="9525">
+                <a14:hiddenLine xmlns="" xmlns:a14="http://schemas.microsoft.com/office/drawing/2010/main" w="9525">
                   <a:solidFill>
                     <a:srgbClr val="000000"/>
                   </a:solidFill>
@@ -7214,14 +7214,14 @@
           </a:ln>
           <a:extLst>
             <a:ext uri="{909E8E84-426E-40dd-AFC4-6F175D3DCCD1}">
-              <a14:hiddenFill xmlns:a14="http://schemas.microsoft.com/office/drawing/2010/main" xmlns="">
+              <a14:hiddenFill xmlns="" xmlns:a14="http://schemas.microsoft.com/office/drawing/2010/main">
                 <a:solidFill>
                   <a:srgbClr val="FFFFFF"/>
                 </a:solidFill>
               </a14:hiddenFill>
             </a:ext>
             <a:ext uri="{91240B29-F687-4f45-9708-019B960494DF}">
-              <a14:hiddenLine xmlns:a14="http://schemas.microsoft.com/office/drawing/2010/main" xmlns="" w="9525">
+              <a14:hiddenLine xmlns="" xmlns:a14="http://schemas.microsoft.com/office/drawing/2010/main" w="9525">
                 <a:solidFill>
                   <a:srgbClr val="000000"/>
                 </a:solidFill>
@@ -7440,14 +7440,14 @@
             </a:ln>
             <a:extLst>
               <a:ext uri="{909E8E84-426E-40dd-AFC4-6F175D3DCCD1}">
-                <a14:hiddenFill xmlns:a14="http://schemas.microsoft.com/office/drawing/2010/main" xmlns="">
+                <a14:hiddenFill xmlns="" xmlns:a14="http://schemas.microsoft.com/office/drawing/2010/main">
                   <a:solidFill>
                     <a:srgbClr val="FFFFFF"/>
                   </a:solidFill>
                 </a14:hiddenFill>
               </a:ext>
               <a:ext uri="{91240B29-F687-4f45-9708-019B960494DF}">
-                <a14:hiddenLine xmlns:a14="http://schemas.microsoft.com/office/drawing/2010/main" xmlns="" w="9525">
+                <a14:hiddenLine xmlns="" xmlns:a14="http://schemas.microsoft.com/office/drawing/2010/main" w="9525">
                   <a:solidFill>
                     <a:srgbClr val="000000"/>
                   </a:solidFill>
@@ -7931,14 +7931,14 @@
           </a:ln>
           <a:extLst>
             <a:ext uri="{909E8E84-426E-40dd-AFC4-6F175D3DCCD1}">
-              <a14:hiddenFill xmlns:a14="http://schemas.microsoft.com/office/drawing/2010/main" xmlns="">
+              <a14:hiddenFill xmlns="" xmlns:a14="http://schemas.microsoft.com/office/drawing/2010/main">
                 <a:solidFill>
                   <a:srgbClr val="FFFFFF"/>
                 </a:solidFill>
               </a14:hiddenFill>
             </a:ext>
             <a:ext uri="{91240B29-F687-4f45-9708-019B960494DF}">
-              <a14:hiddenLine xmlns:a14="http://schemas.microsoft.com/office/drawing/2010/main" xmlns="" w="9525">
+              <a14:hiddenLine xmlns="" xmlns:a14="http://schemas.microsoft.com/office/drawing/2010/main" w="9525">
                 <a:solidFill>
                   <a:srgbClr val="000000"/>
                 </a:solidFill>
@@ -8192,14 +8192,14 @@
             </a:ln>
             <a:extLst>
               <a:ext uri="{909E8E84-426E-40dd-AFC4-6F175D3DCCD1}">
-                <a14:hiddenFill xmlns:a14="http://schemas.microsoft.com/office/drawing/2010/main" xmlns="">
+                <a14:hiddenFill xmlns="" xmlns:a14="http://schemas.microsoft.com/office/drawing/2010/main">
                   <a:solidFill>
                     <a:srgbClr val="FFFFFF"/>
                   </a:solidFill>
                 </a14:hiddenFill>
               </a:ext>
               <a:ext uri="{91240B29-F687-4f45-9708-019B960494DF}">
-                <a14:hiddenLine xmlns:a14="http://schemas.microsoft.com/office/drawing/2010/main" xmlns="" w="9525">
+                <a14:hiddenLine xmlns="" xmlns:a14="http://schemas.microsoft.com/office/drawing/2010/main" w="9525">
                   <a:solidFill>
                     <a:srgbClr val="000000"/>
                   </a:solidFill>
@@ -8555,14 +8555,14 @@
           </a:ln>
           <a:extLst>
             <a:ext uri="{909E8E84-426E-40dd-AFC4-6F175D3DCCD1}">
-              <a14:hiddenFill xmlns:a14="http://schemas.microsoft.com/office/drawing/2010/main" xmlns="">
+              <a14:hiddenFill xmlns="" xmlns:a14="http://schemas.microsoft.com/office/drawing/2010/main">
                 <a:solidFill>
                   <a:srgbClr val="FFFFFF"/>
                 </a:solidFill>
               </a14:hiddenFill>
             </a:ext>
             <a:ext uri="{91240B29-F687-4f45-9708-019B960494DF}">
-              <a14:hiddenLine xmlns:a14="http://schemas.microsoft.com/office/drawing/2010/main" xmlns="" w="9525">
+              <a14:hiddenLine xmlns="" xmlns:a14="http://schemas.microsoft.com/office/drawing/2010/main" w="9525">
                 <a:solidFill>
                   <a:srgbClr val="000000"/>
                 </a:solidFill>
@@ -8946,14 +8946,14 @@
             </a:ln>
             <a:extLst>
               <a:ext uri="{909E8E84-426E-40dd-AFC4-6F175D3DCCD1}">
-                <a14:hiddenFill xmlns:a14="http://schemas.microsoft.com/office/drawing/2010/main" xmlns="">
+                <a14:hiddenFill xmlns="" xmlns:a14="http://schemas.microsoft.com/office/drawing/2010/main">
                   <a:solidFill>
                     <a:srgbClr val="FFFFFF"/>
                   </a:solidFill>
                 </a14:hiddenFill>
               </a:ext>
               <a:ext uri="{91240B29-F687-4f45-9708-019B960494DF}">
-                <a14:hiddenLine xmlns:a14="http://schemas.microsoft.com/office/drawing/2010/main" xmlns="" w="9525">
+                <a14:hiddenLine xmlns="" xmlns:a14="http://schemas.microsoft.com/office/drawing/2010/main" w="9525">
                   <a:solidFill>
                     <a:srgbClr val="000000"/>
                   </a:solidFill>
@@ -13882,17 +13882,17 @@
           </a:ln>
           <a:extLst>
             <a:ext uri="{FAA26D3D-D897-4be2-8F04-BA451C77F1D7}">
-              <ma14:placeholderFlag xmlns:ma14="http://schemas.microsoft.com/office/mac/drawingml/2011/main" xmlns="" val="1"/>
+              <ma14:placeholderFlag xmlns="" xmlns:ma14="http://schemas.microsoft.com/office/mac/drawingml/2011/main" val="1"/>
             </a:ext>
             <a:ext uri="{909E8E84-426E-40dd-AFC4-6F175D3DCCD1}">
-              <a14:hiddenFill xmlns:a14="http://schemas.microsoft.com/office/drawing/2010/main" xmlns="">
+              <a14:hiddenFill xmlns="" xmlns:a14="http://schemas.microsoft.com/office/drawing/2010/main">
                 <a:solidFill>
                   <a:srgbClr val="FFFFFF"/>
                 </a:solidFill>
               </a14:hiddenFill>
             </a:ext>
             <a:ext uri="{91240B29-F687-4f45-9708-019B960494DF}">
-              <a14:hiddenLine xmlns:a14="http://schemas.microsoft.com/office/drawing/2010/main" xmlns="" w="9525">
+              <a14:hiddenLine xmlns="" xmlns:a14="http://schemas.microsoft.com/office/drawing/2010/main" w="9525">
                 <a:solidFill>
                   <a:srgbClr val="000000"/>
                 </a:solidFill>
@@ -13943,17 +13943,17 @@
           </a:ln>
           <a:extLst>
             <a:ext uri="{FAA26D3D-D897-4be2-8F04-BA451C77F1D7}">
-              <ma14:placeholderFlag xmlns:ma14="http://schemas.microsoft.com/office/mac/drawingml/2011/main" xmlns="" val="1"/>
+              <ma14:placeholderFlag xmlns="" xmlns:ma14="http://schemas.microsoft.com/office/mac/drawingml/2011/main" val="1"/>
             </a:ext>
             <a:ext uri="{909E8E84-426E-40dd-AFC4-6F175D3DCCD1}">
-              <a14:hiddenFill xmlns:a14="http://schemas.microsoft.com/office/drawing/2010/main" xmlns="">
+              <a14:hiddenFill xmlns="" xmlns:a14="http://schemas.microsoft.com/office/drawing/2010/main">
                 <a:solidFill>
                   <a:srgbClr val="FFFFFF"/>
                 </a:solidFill>
               </a14:hiddenFill>
             </a:ext>
             <a:ext uri="{91240B29-F687-4f45-9708-019B960494DF}">
-              <a14:hiddenLine xmlns:a14="http://schemas.microsoft.com/office/drawing/2010/main" xmlns="" w="9525">
+              <a14:hiddenLine xmlns="" xmlns:a14="http://schemas.microsoft.com/office/drawing/2010/main" w="9525">
                 <a:solidFill>
                   <a:srgbClr val="000000"/>
                 </a:solidFill>
@@ -14600,17 +14600,17 @@
           </a:ln>
           <a:extLst>
             <a:ext uri="{FAA26D3D-D897-4be2-8F04-BA451C77F1D7}">
-              <ma14:placeholderFlag xmlns="" xmlns:ma14="http://schemas.microsoft.com/office/mac/drawingml/2011/main" val="1"/>
+              <ma14:placeholderFlag xmlns:ma14="http://schemas.microsoft.com/office/mac/drawingml/2011/main" xmlns="" val="1"/>
             </a:ext>
             <a:ext uri="{909E8E84-426E-40dd-AFC4-6F175D3DCCD1}">
-              <a14:hiddenFill xmlns="" xmlns:a14="http://schemas.microsoft.com/office/drawing/2010/main">
+              <a14:hiddenFill xmlns:a14="http://schemas.microsoft.com/office/drawing/2010/main" xmlns="">
                 <a:solidFill>
                   <a:srgbClr val="FFFFFF"/>
                 </a:solidFill>
               </a14:hiddenFill>
             </a:ext>
             <a:ext uri="{91240B29-F687-4f45-9708-019B960494DF}">
-              <a14:hiddenLine xmlns="" xmlns:a14="http://schemas.microsoft.com/office/drawing/2010/main" w="9525">
+              <a14:hiddenLine xmlns:a14="http://schemas.microsoft.com/office/drawing/2010/main" xmlns="" w="9525">
                 <a:solidFill>
                   <a:srgbClr val="000000"/>
                 </a:solidFill>
@@ -14661,17 +14661,17 @@
           </a:ln>
           <a:extLst>
             <a:ext uri="{FAA26D3D-D897-4be2-8F04-BA451C77F1D7}">
-              <ma14:placeholderFlag xmlns="" xmlns:ma14="http://schemas.microsoft.com/office/mac/drawingml/2011/main" val="1"/>
+              <ma14:placeholderFlag xmlns:ma14="http://schemas.microsoft.com/office/mac/drawingml/2011/main" xmlns="" val="1"/>
             </a:ext>
             <a:ext uri="{909E8E84-426E-40dd-AFC4-6F175D3DCCD1}">
-              <a14:hiddenFill xmlns="" xmlns:a14="http://schemas.microsoft.com/office/drawing/2010/main">
+              <a14:hiddenFill xmlns:a14="http://schemas.microsoft.com/office/drawing/2010/main" xmlns="">
                 <a:solidFill>
                   <a:srgbClr val="FFFFFF"/>
                 </a:solidFill>
               </a14:hiddenFill>
             </a:ext>
             <a:ext uri="{91240B29-F687-4f45-9708-019B960494DF}">
-              <a14:hiddenLine xmlns="" xmlns:a14="http://schemas.microsoft.com/office/drawing/2010/main" w="9525">
+              <a14:hiddenLine xmlns:a14="http://schemas.microsoft.com/office/drawing/2010/main" xmlns="" w="9525">
                 <a:solidFill>
                   <a:srgbClr val="000000"/>
                 </a:solidFill>
@@ -15313,17 +15313,17 @@
           </a:ln>
           <a:extLst>
             <a:ext uri="{FAA26D3D-D897-4be2-8F04-BA451C77F1D7}">
-              <ma14:placeholderFlag xmlns="" xmlns:ma14="http://schemas.microsoft.com/office/mac/drawingml/2011/main" val="1"/>
+              <ma14:placeholderFlag xmlns:ma14="http://schemas.microsoft.com/office/mac/drawingml/2011/main" xmlns="" val="1"/>
             </a:ext>
             <a:ext uri="{909E8E84-426E-40dd-AFC4-6F175D3DCCD1}">
-              <a14:hiddenFill xmlns="" xmlns:a14="http://schemas.microsoft.com/office/drawing/2010/main">
+              <a14:hiddenFill xmlns:a14="http://schemas.microsoft.com/office/drawing/2010/main" xmlns="">
                 <a:solidFill>
                   <a:srgbClr val="FFFFFF"/>
                 </a:solidFill>
               </a14:hiddenFill>
             </a:ext>
             <a:ext uri="{91240B29-F687-4f45-9708-019B960494DF}">
-              <a14:hiddenLine xmlns="" xmlns:a14="http://schemas.microsoft.com/office/drawing/2010/main" w="9525">
+              <a14:hiddenLine xmlns:a14="http://schemas.microsoft.com/office/drawing/2010/main" xmlns="" w="9525">
                 <a:solidFill>
                   <a:srgbClr val="000000"/>
                 </a:solidFill>
@@ -15374,17 +15374,17 @@
           </a:ln>
           <a:extLst>
             <a:ext uri="{FAA26D3D-D897-4be2-8F04-BA451C77F1D7}">
-              <ma14:placeholderFlag xmlns="" xmlns:ma14="http://schemas.microsoft.com/office/mac/drawingml/2011/main" val="1"/>
+              <ma14:placeholderFlag xmlns:ma14="http://schemas.microsoft.com/office/mac/drawingml/2011/main" xmlns="" val="1"/>
             </a:ext>
             <a:ext uri="{909E8E84-426E-40dd-AFC4-6F175D3DCCD1}">
-              <a14:hiddenFill xmlns="" xmlns:a14="http://schemas.microsoft.com/office/drawing/2010/main">
+              <a14:hiddenFill xmlns:a14="http://schemas.microsoft.com/office/drawing/2010/main" xmlns="">
                 <a:solidFill>
                   <a:srgbClr val="FFFFFF"/>
                 </a:solidFill>
               </a14:hiddenFill>
             </a:ext>
             <a:ext uri="{91240B29-F687-4f45-9708-019B960494DF}">
-              <a14:hiddenLine xmlns="" xmlns:a14="http://schemas.microsoft.com/office/drawing/2010/main" w="9525">
+              <a14:hiddenLine xmlns:a14="http://schemas.microsoft.com/office/drawing/2010/main" xmlns="" w="9525">
                 <a:solidFill>
                   <a:srgbClr val="000000"/>
                 </a:solidFill>
@@ -16047,14 +16047,14 @@
           </a:ln>
           <a:extLst>
             <a:ext uri="{909E8E84-426E-40dd-AFC4-6F175D3DCCD1}">
-              <a14:hiddenFill xmlns="" xmlns:a14="http://schemas.microsoft.com/office/drawing/2010/main">
+              <a14:hiddenFill xmlns:a14="http://schemas.microsoft.com/office/drawing/2010/main" xmlns="">
                 <a:solidFill>
                   <a:srgbClr val="FFFFFF"/>
                 </a:solidFill>
               </a14:hiddenFill>
             </a:ext>
             <a:ext uri="{91240B29-F687-4f45-9708-019B960494DF}">
-              <a14:hiddenLine xmlns="" xmlns:a14="http://schemas.microsoft.com/office/drawing/2010/main" w="9525">
+              <a14:hiddenLine xmlns:a14="http://schemas.microsoft.com/office/drawing/2010/main" xmlns="" w="9525">
                 <a:solidFill>
                   <a:srgbClr val="000000"/>
                 </a:solidFill>
@@ -16190,14 +16190,14 @@
           </a:ln>
           <a:extLst>
             <a:ext uri="{909E8E84-426E-40dd-AFC4-6F175D3DCCD1}">
-              <a14:hiddenFill xmlns="" xmlns:a14="http://schemas.microsoft.com/office/drawing/2010/main">
+              <a14:hiddenFill xmlns:a14="http://schemas.microsoft.com/office/drawing/2010/main" xmlns="">
                 <a:solidFill>
                   <a:srgbClr val="FFFFFF"/>
                 </a:solidFill>
               </a14:hiddenFill>
             </a:ext>
             <a:ext uri="{91240B29-F687-4f45-9708-019B960494DF}">
-              <a14:hiddenLine xmlns="" xmlns:a14="http://schemas.microsoft.com/office/drawing/2010/main" w="9525">
+              <a14:hiddenLine xmlns:a14="http://schemas.microsoft.com/office/drawing/2010/main" xmlns="" w="9525">
                 <a:solidFill>
                   <a:srgbClr val="000000"/>
                 </a:solidFill>

</xml_diff>